<commit_message>
Added HW 16/17 and a few lectures
Signed-off-by: Justin Minsk <justin.minsk@gmail.com>
</commit_message>
<xml_diff>
--- a/Store_Router/Project Overview.pptx
+++ b/Store_Router/Project Overview.pptx
@@ -170,6 +170,10 @@
     </p:ext>
   </p:extLst>
 </p:presentation>
+</file>
+
+<file path=ppt/revisionInfo.xml><?xml version="1.0" encoding="utf-8"?>
+<p1510:revInfo xmlns:a="http://schemas.openxmlformats.org/drawingml/2006/main" xmlns:r="http://schemas.openxmlformats.org/officeDocument/2006/relationships" xmlns:p1510="http://schemas.microsoft.com/office/powerpoint/2015/10/main"/>
 </file>
 
 <file path=ppt/handoutMasters/handoutMaster1.xml><?xml version="1.0" encoding="utf-8"?>
@@ -1116,7 +1120,7 @@
               <a:pPr/>
               <a:t>1</a:t>
             </a:fld>
-            <a:endParaRPr lang="en-US"/>
+            <a:endParaRPr lang="en-US" dirty="0"/>
           </a:p>
         </p:txBody>
       </p:sp>
@@ -1650,7 +1654,7 @@
               <a:pPr/>
               <a:t>2</a:t>
             </a:fld>
-            <a:endParaRPr lang="en-US"/>
+            <a:endParaRPr lang="en-US" dirty="0"/>
           </a:p>
         </p:txBody>
       </p:sp>
@@ -1738,7 +1742,7 @@
               <a:pPr/>
               <a:t>3</a:t>
             </a:fld>
-            <a:endParaRPr lang="en-US"/>
+            <a:endParaRPr lang="en-US" dirty="0"/>
           </a:p>
         </p:txBody>
       </p:sp>
@@ -6815,7 +6819,7 @@
           <a:lstStyle/>
           <a:p>
             <a:r>
-              <a:rPr lang="en-US"/>
+              <a:rPr lang="en-US" dirty="0"/>
               <a:t>Project Overview</a:t>
             </a:r>
           </a:p>
@@ -11124,20 +11128,25 @@
             <p:ph type="body" idx="1"/>
           </p:nvPr>
         </p:nvSpPr>
-        <p:spPr/>
+        <p:spPr>
+          <a:xfrm>
+            <a:off x="1828800" y="2057400"/>
+            <a:ext cx="6629400" cy="3962400"/>
+          </a:xfrm>
+        </p:spPr>
         <p:txBody>
           <a:bodyPr/>
           <a:lstStyle/>
           <a:p>
             <a:r>
               <a:rPr lang="en-US" dirty="0"/>
-              <a:t>Create an application that finds the smallest distance to travel in a store using a list created by the user.</a:t>
+              <a:t>An application that routes the smallest distance to travel in a store using a grocery list created by the user, thus taking the shortest amount of time in the store.</a:t>
             </a:r>
           </a:p>
           <a:p>
             <a:r>
               <a:rPr lang="en-US" dirty="0"/>
-              <a:t>Other applications include list creation and shared lists to help with shopping, but there are currently no applications that look at a grid of the store and route your shopping.</a:t>
+              <a:t>Other applications utilize list creation and shared lists to help with shopping, but there are currently no applications that look at a grid of the store and route your shopping.</a:t>
             </a:r>
           </a:p>
         </p:txBody>
@@ -11721,7 +11730,7 @@
         </p:nvSpPr>
         <p:spPr bwMode="auto">
           <a:xfrm>
-            <a:off x="1524000" y="3201827"/>
+            <a:off x="1524000" y="3470552"/>
             <a:ext cx="4724400" cy="2585323"/>
           </a:xfrm>
           <a:prstGeom prst="rect">

</xml_diff>